<commit_message>
practiced class progress and exercises
</commit_message>
<xml_diff>
--- a/02 - reactive patterns/.slides/Day 04 - reactive filtering.pptx
+++ b/02 - reactive patterns/.slides/Day 04 - reactive filtering.pptx
@@ -139,6 +139,35 @@
 </p:presentation>
 </file>
 
+<file path=ppt/changesInfos/changesInfo1.xml><?xml version="1.0" encoding="utf-8"?>
+<pc:chgInfo xmlns:a="http://schemas.openxmlformats.org/drawingml/2006/main" xmlns:r="http://schemas.openxmlformats.org/officeDocument/2006/relationships" xmlns:ac="http://schemas.microsoft.com/office/drawing/2013/main/command" xmlns:pc="http://schemas.microsoft.com/office/powerpoint/2013/main/command">
+  <pc:docChgLst>
+    <pc:chgData name="João Giacomin Oliveira" userId="9caa7954577c5368" providerId="LiveId" clId="{15E2ECC7-DA14-4CA6-B61F-C4B8C033960B}"/>
+    <pc:docChg chg="custSel modSld">
+      <pc:chgData name="João Giacomin Oliveira" userId="9caa7954577c5368" providerId="LiveId" clId="{15E2ECC7-DA14-4CA6-B61F-C4B8C033960B}" dt="2026-02-06T01:23:51.382" v="0" actId="313"/>
+      <pc:docMkLst>
+        <pc:docMk/>
+      </pc:docMkLst>
+      <pc:sldChg chg="modSp mod">
+        <pc:chgData name="João Giacomin Oliveira" userId="9caa7954577c5368" providerId="LiveId" clId="{15E2ECC7-DA14-4CA6-B61F-C4B8C033960B}" dt="2026-02-06T01:23:51.382" v="0" actId="313"/>
+        <pc:sldMkLst>
+          <pc:docMk/>
+          <pc:sldMk cId="98885256" sldId="295"/>
+        </pc:sldMkLst>
+        <pc:spChg chg="mod">
+          <ac:chgData name="João Giacomin Oliveira" userId="9caa7954577c5368" providerId="LiveId" clId="{15E2ECC7-DA14-4CA6-B61F-C4B8C033960B}" dt="2026-02-06T01:23:51.382" v="0" actId="313"/>
+          <ac:spMkLst>
+            <pc:docMk/>
+            <pc:sldMk cId="98885256" sldId="295"/>
+            <ac:spMk id="3" creationId="{981A23C2-1004-2B1E-AEF1-B53F9E21EEE8}"/>
+          </ac:spMkLst>
+        </pc:spChg>
+      </pc:sldChg>
+    </pc:docChg>
+  </pc:docChgLst>
+</pc:chgInfo>
+</file>
+
 <file path=ppt/notesMasters/notesMaster1.xml><?xml version="1.0" encoding="utf-8"?>
 <p:notesMaster xmlns:a="http://schemas.openxmlformats.org/drawingml/2006/main" xmlns:r="http://schemas.openxmlformats.org/officeDocument/2006/relationships" xmlns:p="http://schemas.openxmlformats.org/presentationml/2006/main">
   <p:cSld>
@@ -221,7 +250,7 @@
           <a:p>
             <a:fld id="{B83411B5-A9B8-6D4E-A83B-91456309AD37}" type="datetimeFigureOut">
               <a:rPr lang="en-US" smtClean="0"/>
-              <a:t>1/15/26</a:t>
+              <a:t>2/5/2026</a:t>
             </a:fld>
             <a:endParaRPr lang="en-US"/>
           </a:p>
@@ -2787,7 +2816,7 @@
           <a:p>
             <a:fld id="{42324503-65B2-B147-B7D0-901C284D8BB3}" type="datetimeFigureOut">
               <a:rPr lang="en-US" smtClean="0"/>
-              <a:t>1/15/26</a:t>
+              <a:t>2/5/2026</a:t>
             </a:fld>
             <a:endParaRPr lang="en-US"/>
           </a:p>
@@ -4447,15 +4476,7 @@
             </a:pPr>
             <a:r>
               <a:rPr lang="en-CA" dirty="0"/>
-              <a:t>Exercise: Create an app that has multiple </a:t>
-            </a:r>
-            <a:r>
-              <a:rPr lang="en-CA" dirty="0" err="1"/>
-              <a:t>componente</a:t>
-            </a:r>
-            <a:r>
-              <a:rPr lang="en-CA" dirty="0"/>
-              <a:t> respond to a single event.</a:t>
+              <a:t>Exercise: Create an app that has multiple component respond to a single event.</a:t>
             </a:r>
           </a:p>
           <a:p>

</xml_diff>